<commit_message>
Adds checkpoints to not save intermediate activations
</commit_message>
<xml_diff>
--- a/Latex/ppts/classifier.pptx
+++ b/Latex/ppts/classifier.pptx
@@ -104,6 +104,11 @@
       </a:defRPr>
     </a:lvl9pPr>
   </p:defaultTextStyle>
+  <p:extLst>
+    <p:ext uri="{EFAFB233-063F-42B5-8137-9DF3F51BA10A}">
+      <p15:sldGuideLst xmlns:p15="http://schemas.microsoft.com/office/powerpoint/2012/main"/>
+    </p:ext>
+  </p:extLst>
 </p:presentation>
 </file>
 
@@ -238,7 +243,7 @@
           <a:p>
             <a:fld id="{2927EF37-EBE6-624F-9D99-9A303827BE65}" type="datetimeFigureOut">
               <a:rPr lang="en-US" smtClean="0"/>
-              <a:t>6/7/18</a:t>
+              <a:t>6/12/18</a:t>
             </a:fld>
             <a:endParaRPr lang="en-US"/>
           </a:p>
@@ -408,7 +413,7 @@
           <a:p>
             <a:fld id="{2927EF37-EBE6-624F-9D99-9A303827BE65}" type="datetimeFigureOut">
               <a:rPr lang="en-US" smtClean="0"/>
-              <a:t>6/7/18</a:t>
+              <a:t>6/12/18</a:t>
             </a:fld>
             <a:endParaRPr lang="en-US"/>
           </a:p>
@@ -588,7 +593,7 @@
           <a:p>
             <a:fld id="{2927EF37-EBE6-624F-9D99-9A303827BE65}" type="datetimeFigureOut">
               <a:rPr lang="en-US" smtClean="0"/>
-              <a:t>6/7/18</a:t>
+              <a:t>6/12/18</a:t>
             </a:fld>
             <a:endParaRPr lang="en-US"/>
           </a:p>
@@ -758,7 +763,7 @@
           <a:p>
             <a:fld id="{2927EF37-EBE6-624F-9D99-9A303827BE65}" type="datetimeFigureOut">
               <a:rPr lang="en-US" smtClean="0"/>
-              <a:t>6/7/18</a:t>
+              <a:t>6/12/18</a:t>
             </a:fld>
             <a:endParaRPr lang="en-US"/>
           </a:p>
@@ -1004,7 +1009,7 @@
           <a:p>
             <a:fld id="{2927EF37-EBE6-624F-9D99-9A303827BE65}" type="datetimeFigureOut">
               <a:rPr lang="en-US" smtClean="0"/>
-              <a:t>6/7/18</a:t>
+              <a:t>6/12/18</a:t>
             </a:fld>
             <a:endParaRPr lang="en-US"/>
           </a:p>
@@ -1236,7 +1241,7 @@
           <a:p>
             <a:fld id="{2927EF37-EBE6-624F-9D99-9A303827BE65}" type="datetimeFigureOut">
               <a:rPr lang="en-US" smtClean="0"/>
-              <a:t>6/7/18</a:t>
+              <a:t>6/12/18</a:t>
             </a:fld>
             <a:endParaRPr lang="en-US"/>
           </a:p>
@@ -1603,7 +1608,7 @@
           <a:p>
             <a:fld id="{2927EF37-EBE6-624F-9D99-9A303827BE65}" type="datetimeFigureOut">
               <a:rPr lang="en-US" smtClean="0"/>
-              <a:t>6/7/18</a:t>
+              <a:t>6/12/18</a:t>
             </a:fld>
             <a:endParaRPr lang="en-US"/>
           </a:p>
@@ -1721,7 +1726,7 @@
           <a:p>
             <a:fld id="{2927EF37-EBE6-624F-9D99-9A303827BE65}" type="datetimeFigureOut">
               <a:rPr lang="en-US" smtClean="0"/>
-              <a:t>6/7/18</a:t>
+              <a:t>6/12/18</a:t>
             </a:fld>
             <a:endParaRPr lang="en-US"/>
           </a:p>
@@ -1816,7 +1821,7 @@
           <a:p>
             <a:fld id="{2927EF37-EBE6-624F-9D99-9A303827BE65}" type="datetimeFigureOut">
               <a:rPr lang="en-US" smtClean="0"/>
-              <a:t>6/7/18</a:t>
+              <a:t>6/12/18</a:t>
             </a:fld>
             <a:endParaRPr lang="en-US"/>
           </a:p>
@@ -2093,7 +2098,7 @@
           <a:p>
             <a:fld id="{2927EF37-EBE6-624F-9D99-9A303827BE65}" type="datetimeFigureOut">
               <a:rPr lang="en-US" smtClean="0"/>
-              <a:t>6/7/18</a:t>
+              <a:t>6/12/18</a:t>
             </a:fld>
             <a:endParaRPr lang="en-US"/>
           </a:p>
@@ -2346,7 +2351,7 @@
           <a:p>
             <a:fld id="{2927EF37-EBE6-624F-9D99-9A303827BE65}" type="datetimeFigureOut">
               <a:rPr lang="en-US" smtClean="0"/>
-              <a:t>6/7/18</a:t>
+              <a:t>6/12/18</a:t>
             </a:fld>
             <a:endParaRPr lang="en-US"/>
           </a:p>
@@ -2559,7 +2564,7 @@
           <a:p>
             <a:fld id="{2927EF37-EBE6-624F-9D99-9A303827BE65}" type="datetimeFigureOut">
               <a:rPr lang="en-US" smtClean="0"/>
-              <a:t>6/7/18</a:t>
+              <a:t>6/12/18</a:t>
             </a:fld>
             <a:endParaRPr lang="en-US"/>
           </a:p>
@@ -3207,7 +3212,6 @@
               <a:rPr lang="en-US" sz="1200" dirty="0" smtClean="0"/>
               <a:t>FC layer</a:t>
             </a:r>
-            <a:endParaRPr lang="en-US" sz="1200" dirty="0" smtClean="0"/>
           </a:p>
         </p:txBody>
       </p:sp>
@@ -3283,7 +3287,6 @@
               <a:rPr lang="en-US" sz="1200" dirty="0" smtClean="0"/>
               <a:t>FC layer</a:t>
             </a:r>
-            <a:endParaRPr lang="en-US" sz="1200" dirty="0" smtClean="0"/>
           </a:p>
         </p:txBody>
       </p:sp>
@@ -3303,7 +3306,7 @@
           </a:prstGeom>
           <a:solidFill>
             <a:schemeClr val="bg1">
-              <a:lumMod val="65000"/>
+              <a:lumMod val="85000"/>
             </a:schemeClr>
           </a:solidFill>
         </p:spPr>
@@ -3340,8 +3343,8 @@
         </p:nvSpPr>
         <p:spPr>
           <a:xfrm>
-            <a:off x="5266512" y="4124732"/>
-            <a:ext cx="1171283" cy="276999"/>
+            <a:off x="5266511" y="4035992"/>
+            <a:ext cx="1171283" cy="461665"/>
           </a:xfrm>
           <a:prstGeom prst="rect">
             <a:avLst/>
@@ -3357,11 +3360,14 @@
             <a:pPr algn="ctr"/>
             <a:r>
               <a:rPr lang="en-US" sz="1200" dirty="0" smtClean="0"/>
-              <a:t>15</a:t>
-            </a:r>
+              <a:t>Input Image</a:t>
+            </a:r>
+          </a:p>
+          <a:p>
+            <a:pPr algn="ctr"/>
             <a:r>
               <a:rPr lang="en-US" sz="1200" dirty="0" smtClean="0"/>
-              <a:t>x15x512</a:t>
+              <a:t>15x15x512</a:t>
             </a:r>
             <a:endParaRPr lang="en-US" sz="1200" dirty="0"/>
           </a:p>

</xml_diff>